<commit_message>
added local version in addition to streamlit version
</commit_message>
<xml_diff>
--- a/Capstone_Presentation.pptx
+++ b/Capstone_Presentation.pptx
@@ -14,8 +14,10 @@
     <p:sldId id="266" r:id="rId8"/>
     <p:sldId id="262" r:id="rId9"/>
     <p:sldId id="263" r:id="rId10"/>
-    <p:sldId id="264" r:id="rId11"/>
-    <p:sldId id="265" r:id="rId12"/>
+    <p:sldId id="267" r:id="rId11"/>
+    <p:sldId id="264" r:id="rId12"/>
+    <p:sldId id="265" r:id="rId13"/>
+    <p:sldId id="268" r:id="rId14"/>
   </p:sldIdLst>
   <p:sldSz cx="12192000" cy="6858000"/>
   <p:notesSz cx="6858000" cy="9144000"/>
@@ -4297,13 +4299,13 @@
         </p:nvSpPr>
         <p:spPr>
           <a:xfrm>
-            <a:off x="1143000" y="1181101"/>
+            <a:off x="446315" y="420397"/>
             <a:ext cx="4953000" cy="2247899"/>
           </a:xfrm>
         </p:spPr>
         <p:txBody>
           <a:bodyPr anchor="t">
-            <a:normAutofit/>
+            <a:normAutofit fontScale="90000"/>
           </a:bodyPr>
           <a:lstStyle/>
           <a:p>
@@ -4334,68 +4336,78 @@
                 <a:latin typeface="Times New Roman" panose="02020603050405020304" pitchFamily="18" charset="0"/>
                 <a:cs typeface="Times New Roman" panose="02020603050405020304" pitchFamily="18" charset="0"/>
               </a:rPr>
-              <a:t>Application</a:t>
-            </a:r>
-          </a:p>
-        </p:txBody>
-      </p:sp>
-      <p:sp>
-        <p:nvSpPr>
-          <p:cNvPr id="3" name="Subtitle 2">
-            <a:extLst>
-              <a:ext uri="{FF2B5EF4-FFF2-40B4-BE49-F238E27FC236}">
-                <a16:creationId xmlns:a16="http://schemas.microsoft.com/office/drawing/2014/main" id="{1986505B-3845-DC86-A488-3A126FE11647}"/>
-              </a:ext>
-            </a:extLst>
-          </p:cNvPr>
-          <p:cNvSpPr>
-            <a:spLocks noGrp="1"/>
-          </p:cNvSpPr>
-          <p:nvPr>
-            <p:ph type="subTitle" idx="1"/>
-          </p:nvPr>
-        </p:nvSpPr>
-        <p:spPr>
-          <a:xfrm>
-            <a:off x="1143001" y="4093232"/>
-            <a:ext cx="3525146" cy="1728728"/>
-          </a:xfrm>
-        </p:spPr>
-        <p:txBody>
-          <a:bodyPr anchor="b">
-            <a:normAutofit/>
-          </a:bodyPr>
-          <a:lstStyle/>
-          <a:p>
-            <a:r>
-              <a:rPr lang="en-US" dirty="0">
+              <a:t>Scoring</a:t>
+            </a:r>
+            <a:br>
+              <a:rPr lang="en-US" sz="4400" dirty="0">
                 <a:solidFill>
                   <a:srgbClr val="FFFFFF"/>
                 </a:solidFill>
                 <a:latin typeface="Times New Roman" panose="02020603050405020304" pitchFamily="18" charset="0"/>
                 <a:cs typeface="Times New Roman" panose="02020603050405020304" pitchFamily="18" charset="0"/>
               </a:rPr>
-              <a:t>Ben Moss</a:t>
-            </a:r>
-          </a:p>
-          <a:p>
-            <a:r>
-              <a:rPr lang="en-US" dirty="0">
+            </a:br>
+            <a:r>
+              <a:rPr lang="en-US" sz="4400" dirty="0">
                 <a:solidFill>
                   <a:srgbClr val="FFFFFF"/>
                 </a:solidFill>
                 <a:latin typeface="Times New Roman" panose="02020603050405020304" pitchFamily="18" charset="0"/>
                 <a:cs typeface="Times New Roman" panose="02020603050405020304" pitchFamily="18" charset="0"/>
               </a:rPr>
+              <a:t>Application</a:t>
+            </a:r>
+          </a:p>
+        </p:txBody>
+      </p:sp>
+      <p:sp>
+        <p:nvSpPr>
+          <p:cNvPr id="3" name="Subtitle 2">
+            <a:extLst>
+              <a:ext uri="{FF2B5EF4-FFF2-40B4-BE49-F238E27FC236}">
+                <a16:creationId xmlns:a16="http://schemas.microsoft.com/office/drawing/2014/main" id="{1986505B-3845-DC86-A488-3A126FE11647}"/>
+              </a:ext>
+            </a:extLst>
+          </p:cNvPr>
+          <p:cNvSpPr>
+            <a:spLocks noGrp="1"/>
+          </p:cNvSpPr>
+          <p:nvPr>
+            <p:ph type="subTitle" idx="1"/>
+          </p:nvPr>
+        </p:nvSpPr>
+        <p:spPr>
+          <a:xfrm>
+            <a:off x="0" y="4485118"/>
+            <a:ext cx="4071256" cy="1728728"/>
+          </a:xfrm>
+        </p:spPr>
+        <p:txBody>
+          <a:bodyPr anchor="b">
+            <a:noAutofit/>
+          </a:bodyPr>
+          <a:lstStyle/>
+          <a:p>
+            <a:r>
+              <a:rPr lang="en-US" sz="2400" b="1" dirty="0">
+                <a:latin typeface="Times New Roman" panose="02020603050405020304" pitchFamily="18" charset="0"/>
+                <a:cs typeface="Times New Roman" panose="02020603050405020304" pitchFamily="18" charset="0"/>
+              </a:rPr>
+              <a:t>Ben Moss</a:t>
+            </a:r>
+          </a:p>
+          <a:p>
+            <a:r>
+              <a:rPr lang="en-US" sz="2400" b="1" dirty="0">
+                <a:latin typeface="Times New Roman" panose="02020603050405020304" pitchFamily="18" charset="0"/>
+                <a:cs typeface="Times New Roman" panose="02020603050405020304" pitchFamily="18" charset="0"/>
+              </a:rPr>
               <a:t>March, 2024</a:t>
             </a:r>
           </a:p>
           <a:p>
             <a:r>
-              <a:rPr lang="en-US" dirty="0">
-                <a:solidFill>
-                  <a:srgbClr val="FFFFFF"/>
-                </a:solidFill>
+              <a:rPr lang="en-US" sz="2400" b="1" dirty="0">
                 <a:latin typeface="Times New Roman" panose="02020603050405020304" pitchFamily="18" charset="0"/>
                 <a:cs typeface="Times New Roman" panose="02020603050405020304" pitchFamily="18" charset="0"/>
               </a:rPr>
@@ -4439,7 +4451,7 @@
           <p:cNvPr id="2" name="Title 1">
             <a:extLst>
               <a:ext uri="{FF2B5EF4-FFF2-40B4-BE49-F238E27FC236}">
-                <a16:creationId xmlns:a16="http://schemas.microsoft.com/office/drawing/2014/main" id="{E568FC30-8B85-FDF8-AB85-F42AE8053BD6}"/>
+                <a16:creationId xmlns:a16="http://schemas.microsoft.com/office/drawing/2014/main" id="{FE0CD4F1-21D3-6C4A-0194-73867BFF507F}"/>
               </a:ext>
             </a:extLst>
           </p:cNvPr>
@@ -4452,45 +4464,98 @@
         </p:nvSpPr>
         <p:spPr/>
         <p:txBody>
+          <a:bodyPr>
+            <a:normAutofit/>
+          </a:bodyPr>
+          <a:lstStyle/>
+          <a:p>
+            <a:pPr marL="0" indent="0"/>
+            <a:r>
+              <a:rPr lang="en-US" sz="4000" b="1" dirty="0">
+                <a:solidFill>
+                  <a:srgbClr val="FF0000"/>
+                </a:solidFill>
+                <a:latin typeface="Times New Roman" panose="02020603050405020304" pitchFamily="18" charset="0"/>
+                <a:cs typeface="Times New Roman" panose="02020603050405020304" pitchFamily="18" charset="0"/>
+              </a:rPr>
+              <a:t>BEAST Performance</a:t>
+            </a:r>
+            <a:endParaRPr lang="en-US" b="1" dirty="0">
+              <a:solidFill>
+                <a:srgbClr val="FF0000"/>
+              </a:solidFill>
+            </a:endParaRPr>
+          </a:p>
+        </p:txBody>
+      </p:sp>
+      <p:sp>
+        <p:nvSpPr>
+          <p:cNvPr id="3" name="Content Placeholder 2">
+            <a:extLst>
+              <a:ext uri="{FF2B5EF4-FFF2-40B4-BE49-F238E27FC236}">
+                <a16:creationId xmlns:a16="http://schemas.microsoft.com/office/drawing/2014/main" id="{0DEA6BC7-9703-E071-DCB6-1BDB036FD8EF}"/>
+              </a:ext>
+            </a:extLst>
+          </p:cNvPr>
+          <p:cNvSpPr>
+            <a:spLocks noGrp="1"/>
+          </p:cNvSpPr>
+          <p:nvPr>
+            <p:ph idx="1"/>
+          </p:nvPr>
+        </p:nvSpPr>
+        <p:spPr/>
+        <p:txBody>
           <a:bodyPr/>
           <a:lstStyle/>
           <a:p>
             <a:r>
-              <a:rPr lang="en-US" dirty="0"/>
-              <a:t>Recommendations and Guidance</a:t>
-            </a:r>
-          </a:p>
-        </p:txBody>
-      </p:sp>
-      <p:sp>
-        <p:nvSpPr>
-          <p:cNvPr id="3" name="Content Placeholder 2">
-            <a:extLst>
-              <a:ext uri="{FF2B5EF4-FFF2-40B4-BE49-F238E27FC236}">
-                <a16:creationId xmlns:a16="http://schemas.microsoft.com/office/drawing/2014/main" id="{A4374351-9E2A-DEE3-317F-E48DB8696262}"/>
-              </a:ext>
-            </a:extLst>
-          </p:cNvPr>
-          <p:cNvSpPr>
-            <a:spLocks noGrp="1"/>
-          </p:cNvSpPr>
-          <p:nvPr>
-            <p:ph idx="1"/>
-          </p:nvPr>
-        </p:nvSpPr>
-        <p:spPr/>
-        <p:txBody>
-          <a:bodyPr/>
-          <a:lstStyle/>
-          <a:p>
-            <a:endParaRPr lang="en-US"/>
+              <a:rPr lang="en-US" dirty="0">
+                <a:latin typeface="Times New Roman" panose="02020603050405020304" pitchFamily="18" charset="0"/>
+                <a:cs typeface="Times New Roman" panose="02020603050405020304" pitchFamily="18" charset="0"/>
+              </a:rPr>
+              <a:t>Word Clouds, Word Encoding Algorithm Graphs, </a:t>
+            </a:r>
+          </a:p>
+          <a:p>
+            <a:r>
+              <a:rPr lang="en-US" dirty="0">
+                <a:latin typeface="Times New Roman" panose="02020603050405020304" pitchFamily="18" charset="0"/>
+                <a:cs typeface="Times New Roman" panose="02020603050405020304" pitchFamily="18" charset="0"/>
+              </a:rPr>
+              <a:t>Compare performance of Sentiment Analyzer with </a:t>
+            </a:r>
+            <a:r>
+              <a:rPr lang="en-US" b="0" i="0" u="none" strike="noStrike" dirty="0">
+                <a:solidFill>
+                  <a:srgbClr val="E6EDF3"/>
+                </a:solidFill>
+                <a:effectLst/>
+                <a:latin typeface="Times New Roman" panose="02020603050405020304" pitchFamily="18" charset="0"/>
+                <a:cs typeface="Times New Roman" panose="02020603050405020304" pitchFamily="18" charset="0"/>
+              </a:rPr>
+              <a:t>VADER sentiment analyzer. </a:t>
+            </a:r>
+            <a:endParaRPr lang="en-US" dirty="0">
+              <a:latin typeface="Times New Roman" panose="02020603050405020304" pitchFamily="18" charset="0"/>
+              <a:cs typeface="Times New Roman" panose="02020603050405020304" pitchFamily="18" charset="0"/>
+            </a:endParaRPr>
+          </a:p>
+          <a:p>
+            <a:r>
+              <a:rPr lang="en-US" dirty="0">
+                <a:latin typeface="Times New Roman" panose="02020603050405020304" pitchFamily="18" charset="0"/>
+                <a:cs typeface="Times New Roman" panose="02020603050405020304" pitchFamily="18" charset="0"/>
+              </a:rPr>
+              <a:t>KDE Plots,  A/B Testing Results</a:t>
+            </a:r>
           </a:p>
         </p:txBody>
       </p:sp>
     </p:spTree>
     <p:extLst>
       <p:ext uri="{BB962C8B-B14F-4D97-AF65-F5344CB8AC3E}">
-        <p14:creationId xmlns:p14="http://schemas.microsoft.com/office/powerpoint/2010/main" val="4207199468"/>
+        <p14:creationId xmlns:p14="http://schemas.microsoft.com/office/powerpoint/2010/main" val="1911129665"/>
       </p:ext>
     </p:extLst>
   </p:cSld>
@@ -4522,6 +4587,171 @@
           <p:cNvPr id="2" name="Title 1">
             <a:extLst>
               <a:ext uri="{FF2B5EF4-FFF2-40B4-BE49-F238E27FC236}">
+                <a16:creationId xmlns:a16="http://schemas.microsoft.com/office/drawing/2014/main" id="{E568FC30-8B85-FDF8-AB85-F42AE8053BD6}"/>
+              </a:ext>
+            </a:extLst>
+          </p:cNvPr>
+          <p:cNvSpPr>
+            <a:spLocks noGrp="1"/>
+          </p:cNvSpPr>
+          <p:nvPr>
+            <p:ph type="title"/>
+          </p:nvPr>
+        </p:nvSpPr>
+        <p:spPr/>
+        <p:txBody>
+          <a:bodyPr/>
+          <a:lstStyle/>
+          <a:p>
+            <a:r>
+              <a:rPr lang="en-US" dirty="0">
+                <a:latin typeface="Times New Roman" panose="02020603050405020304" pitchFamily="18" charset="0"/>
+                <a:cs typeface="Times New Roman" panose="02020603050405020304" pitchFamily="18" charset="0"/>
+              </a:rPr>
+              <a:t>Recommendations and Guidance</a:t>
+            </a:r>
+          </a:p>
+        </p:txBody>
+      </p:sp>
+      <p:sp>
+        <p:nvSpPr>
+          <p:cNvPr id="3" name="Content Placeholder 2">
+            <a:extLst>
+              <a:ext uri="{FF2B5EF4-FFF2-40B4-BE49-F238E27FC236}">
+                <a16:creationId xmlns:a16="http://schemas.microsoft.com/office/drawing/2014/main" id="{A4374351-9E2A-DEE3-317F-E48DB8696262}"/>
+              </a:ext>
+            </a:extLst>
+          </p:cNvPr>
+          <p:cNvSpPr>
+            <a:spLocks noGrp="1"/>
+          </p:cNvSpPr>
+          <p:nvPr>
+            <p:ph idx="1"/>
+          </p:nvPr>
+        </p:nvSpPr>
+        <p:spPr/>
+        <p:txBody>
+          <a:bodyPr>
+            <a:normAutofit lnSpcReduction="10000"/>
+          </a:bodyPr>
+          <a:lstStyle/>
+          <a:p>
+            <a:r>
+              <a:rPr lang="en-US" dirty="0">
+                <a:latin typeface="Times New Roman" panose="02020603050405020304" pitchFamily="18" charset="0"/>
+                <a:cs typeface="Times New Roman" panose="02020603050405020304" pitchFamily="18" charset="0"/>
+              </a:rPr>
+              <a:t>Develop labeling functions and other word encoding algorithms for further optimization.</a:t>
+            </a:r>
+          </a:p>
+          <a:p>
+            <a:pPr indent="0">
+              <a:buNone/>
+            </a:pPr>
+            <a:r>
+              <a:rPr lang="en-US" dirty="0">
+                <a:latin typeface="Times New Roman" panose="02020603050405020304" pitchFamily="18" charset="0"/>
+                <a:cs typeface="Times New Roman" panose="02020603050405020304" pitchFamily="18" charset="0"/>
+              </a:rPr>
+              <a:t>	Hand Label a greater expanse of samples to acquire more detailed and 		meaningful Snorkel summary statistics. </a:t>
+            </a:r>
+          </a:p>
+          <a:p>
+            <a:r>
+              <a:rPr lang="en-US" dirty="0">
+                <a:latin typeface="Times New Roman" panose="02020603050405020304" pitchFamily="18" charset="0"/>
+                <a:cs typeface="Times New Roman" panose="02020603050405020304" pitchFamily="18" charset="0"/>
+              </a:rPr>
+              <a:t>Continue to advance hardware capabilities to develop Neural Network models further.</a:t>
+            </a:r>
+          </a:p>
+          <a:p>
+            <a:pPr lvl="2" indent="0">
+              <a:buNone/>
+            </a:pPr>
+            <a:r>
+              <a:rPr lang="en-US" sz="2000" i="0" dirty="0">
+                <a:latin typeface="Times New Roman" panose="02020603050405020304" pitchFamily="18" charset="0"/>
+                <a:cs typeface="Times New Roman" panose="02020603050405020304" pitchFamily="18" charset="0"/>
+              </a:rPr>
+              <a:t>    	Switch to Microsoft and NVIDIA GPU.</a:t>
+            </a:r>
+          </a:p>
+          <a:p>
+            <a:pPr lvl="1"/>
+            <a:endParaRPr lang="en-US" sz="2600" i="0" dirty="0">
+              <a:latin typeface="Times New Roman" panose="02020603050405020304" pitchFamily="18" charset="0"/>
+              <a:cs typeface="Times New Roman" panose="02020603050405020304" pitchFamily="18" charset="0"/>
+            </a:endParaRPr>
+          </a:p>
+          <a:p>
+            <a:pPr indent="0" algn="ctr">
+              <a:buNone/>
+            </a:pPr>
+            <a:r>
+              <a:rPr lang="en-US" b="1" dirty="0">
+                <a:solidFill>
+                  <a:srgbClr val="FF0000"/>
+                </a:solidFill>
+                <a:latin typeface="Times New Roman" panose="02020603050405020304" pitchFamily="18" charset="0"/>
+                <a:cs typeface="Times New Roman" panose="02020603050405020304" pitchFamily="18" charset="0"/>
+              </a:rPr>
+              <a:t>Apply these labeling functions to other well-defined problems such as customer service evaluations, prescription drug side-effect forms, crowd surfing surveys, etc.</a:t>
+            </a:r>
+            <a:endParaRPr lang="en-US" b="1" i="0" dirty="0">
+              <a:solidFill>
+                <a:srgbClr val="FF0000"/>
+              </a:solidFill>
+              <a:latin typeface="Times New Roman" panose="02020603050405020304" pitchFamily="18" charset="0"/>
+              <a:cs typeface="Times New Roman" panose="02020603050405020304" pitchFamily="18" charset="0"/>
+            </a:endParaRPr>
+          </a:p>
+          <a:p>
+            <a:pPr marL="0" indent="0">
+              <a:buNone/>
+            </a:pPr>
+            <a:endParaRPr lang="en-US" dirty="0">
+              <a:latin typeface="Times New Roman" panose="02020603050405020304" pitchFamily="18" charset="0"/>
+              <a:cs typeface="Times New Roman" panose="02020603050405020304" pitchFamily="18" charset="0"/>
+            </a:endParaRPr>
+          </a:p>
+        </p:txBody>
+      </p:sp>
+    </p:spTree>
+    <p:extLst>
+      <p:ext uri="{BB962C8B-B14F-4D97-AF65-F5344CB8AC3E}">
+        <p14:creationId xmlns:p14="http://schemas.microsoft.com/office/powerpoint/2010/main" val="4207199468"/>
+      </p:ext>
+    </p:extLst>
+  </p:cSld>
+  <p:clrMapOvr>
+    <a:masterClrMapping/>
+  </p:clrMapOvr>
+</p:sld>
+</file>
+
+<file path=ppt/slides/slide12.xml><?xml version="1.0" encoding="utf-8"?>
+<p:sld xmlns:a="http://schemas.openxmlformats.org/drawingml/2006/main" xmlns:r="http://schemas.openxmlformats.org/officeDocument/2006/relationships" xmlns:p="http://schemas.openxmlformats.org/presentationml/2006/main">
+  <p:cSld>
+    <p:spTree>
+      <p:nvGrpSpPr>
+        <p:cNvPr id="1" name=""/>
+        <p:cNvGrpSpPr/>
+        <p:nvPr/>
+      </p:nvGrpSpPr>
+      <p:grpSpPr>
+        <a:xfrm>
+          <a:off x="0" y="0"/>
+          <a:ext cx="0" cy="0"/>
+          <a:chOff x="0" y="0"/>
+          <a:chExt cx="0" cy="0"/>
+        </a:xfrm>
+      </p:grpSpPr>
+      <p:sp>
+        <p:nvSpPr>
+          <p:cNvPr id="2" name="Title 1">
+            <a:extLst>
+              <a:ext uri="{FF2B5EF4-FFF2-40B4-BE49-F238E27FC236}">
                 <a16:creationId xmlns:a16="http://schemas.microsoft.com/office/drawing/2014/main" id="{23737E6A-5CEF-EB8F-7484-1E88444C3D6D}"/>
               </a:ext>
             </a:extLst>
@@ -4539,34 +4769,46 @@
           <a:lstStyle/>
           <a:p>
             <a:r>
+              <a:rPr lang="en-US" dirty="0">
+                <a:latin typeface="Times New Roman" panose="02020603050405020304" pitchFamily="18" charset="0"/>
+                <a:cs typeface="Times New Roman" panose="02020603050405020304" pitchFamily="18" charset="0"/>
+              </a:rPr>
+              <a:t>Conclusion</a:t>
+            </a:r>
+          </a:p>
+        </p:txBody>
+      </p:sp>
+      <p:sp>
+        <p:nvSpPr>
+          <p:cNvPr id="3" name="Content Placeholder 2">
+            <a:extLst>
+              <a:ext uri="{FF2B5EF4-FFF2-40B4-BE49-F238E27FC236}">
+                <a16:creationId xmlns:a16="http://schemas.microsoft.com/office/drawing/2014/main" id="{D3948882-BFC6-51B0-8BA3-55421DC01397}"/>
+              </a:ext>
+            </a:extLst>
+          </p:cNvPr>
+          <p:cNvSpPr>
+            <a:spLocks noGrp="1"/>
+          </p:cNvSpPr>
+          <p:nvPr>
+            <p:ph idx="1"/>
+          </p:nvPr>
+        </p:nvSpPr>
+        <p:spPr/>
+        <p:txBody>
+          <a:bodyPr/>
+          <a:lstStyle/>
+          <a:p>
+            <a:r>
               <a:rPr lang="en-US" dirty="0"/>
-              <a:t>Conclusion</a:t>
-            </a:r>
-          </a:p>
-        </p:txBody>
-      </p:sp>
-      <p:sp>
-        <p:nvSpPr>
-          <p:cNvPr id="3" name="Content Placeholder 2">
-            <a:extLst>
-              <a:ext uri="{FF2B5EF4-FFF2-40B4-BE49-F238E27FC236}">
-                <a16:creationId xmlns:a16="http://schemas.microsoft.com/office/drawing/2014/main" id="{D3948882-BFC6-51B0-8BA3-55421DC01397}"/>
-              </a:ext>
-            </a:extLst>
-          </p:cNvPr>
-          <p:cNvSpPr>
-            <a:spLocks noGrp="1"/>
-          </p:cNvSpPr>
-          <p:nvPr>
-            <p:ph idx="1"/>
-          </p:nvPr>
-        </p:nvSpPr>
-        <p:spPr/>
-        <p:txBody>
-          <a:bodyPr/>
-          <a:lstStyle/>
-          <a:p>
-            <a:endParaRPr lang="en-US"/>
+              <a:t>We use labeling functions in our everyday lives!</a:t>
+            </a:r>
+          </a:p>
+          <a:p>
+            <a:r>
+              <a:rPr lang="en-US" dirty="0"/>
+              <a:t>When we harness multiple powerful modeling techniques with these relatively simple primitive fundamental forms, complex and daunting language processing challenges become simpler and more realistic to understand. </a:t>
+            </a:r>
           </a:p>
         </p:txBody>
       </p:sp>
@@ -4574,6 +4816,384 @@
     <p:extLst>
       <p:ext uri="{BB962C8B-B14F-4D97-AF65-F5344CB8AC3E}">
         <p14:creationId xmlns:p14="http://schemas.microsoft.com/office/powerpoint/2010/main" val="4181538902"/>
+      </p:ext>
+    </p:extLst>
+  </p:cSld>
+  <p:clrMapOvr>
+    <a:masterClrMapping/>
+  </p:clrMapOvr>
+</p:sld>
+</file>
+
+<file path=ppt/slides/slide13.xml><?xml version="1.0" encoding="utf-8"?>
+<p:sld xmlns:a="http://schemas.openxmlformats.org/drawingml/2006/main" xmlns:r="http://schemas.openxmlformats.org/officeDocument/2006/relationships" xmlns:p="http://schemas.openxmlformats.org/presentationml/2006/main">
+  <p:cSld>
+    <p:spTree>
+      <p:nvGrpSpPr>
+        <p:cNvPr id="1" name=""/>
+        <p:cNvGrpSpPr/>
+        <p:nvPr/>
+      </p:nvGrpSpPr>
+      <p:grpSpPr>
+        <a:xfrm>
+          <a:off x="0" y="0"/>
+          <a:ext cx="0" cy="0"/>
+          <a:chOff x="0" y="0"/>
+          <a:chExt cx="0" cy="0"/>
+        </a:xfrm>
+      </p:grpSpPr>
+      <p:sp>
+        <p:nvSpPr>
+          <p:cNvPr id="2" name="Title 1">
+            <a:extLst>
+              <a:ext uri="{FF2B5EF4-FFF2-40B4-BE49-F238E27FC236}">
+                <a16:creationId xmlns:a16="http://schemas.microsoft.com/office/drawing/2014/main" id="{CF398215-AA8A-CBC0-EA1B-BB0A5A58BCA8}"/>
+              </a:ext>
+            </a:extLst>
+          </p:cNvPr>
+          <p:cNvSpPr>
+            <a:spLocks noGrp="1"/>
+          </p:cNvSpPr>
+          <p:nvPr>
+            <p:ph type="title"/>
+          </p:nvPr>
+        </p:nvSpPr>
+        <p:spPr/>
+        <p:txBody>
+          <a:bodyPr/>
+          <a:lstStyle/>
+          <a:p>
+            <a:r>
+              <a:rPr lang="en-US" dirty="0">
+                <a:latin typeface="Times New Roman" panose="02020603050405020304" pitchFamily="18" charset="0"/>
+                <a:cs typeface="Times New Roman" panose="02020603050405020304" pitchFamily="18" charset="0"/>
+              </a:rPr>
+              <a:t>References</a:t>
+            </a:r>
+          </a:p>
+        </p:txBody>
+      </p:sp>
+      <p:sp>
+        <p:nvSpPr>
+          <p:cNvPr id="3" name="Content Placeholder 2">
+            <a:extLst>
+              <a:ext uri="{FF2B5EF4-FFF2-40B4-BE49-F238E27FC236}">
+                <a16:creationId xmlns:a16="http://schemas.microsoft.com/office/drawing/2014/main" id="{4771F892-389C-2465-81F9-343BF0577482}"/>
+              </a:ext>
+            </a:extLst>
+          </p:cNvPr>
+          <p:cNvSpPr>
+            <a:spLocks noGrp="1"/>
+          </p:cNvSpPr>
+          <p:nvPr>
+            <p:ph idx="1"/>
+          </p:nvPr>
+        </p:nvSpPr>
+        <p:spPr/>
+        <p:txBody>
+          <a:bodyPr>
+            <a:normAutofit fontScale="55000" lnSpcReduction="20000"/>
+          </a:bodyPr>
+          <a:lstStyle/>
+          <a:p>
+            <a:r>
+              <a:rPr lang="en-US" b="0" dirty="0">
+                <a:effectLst/>
+                <a:latin typeface="Menlo" panose="020B0609030804020204" pitchFamily="49" charset="0"/>
+              </a:rPr>
+              <a:t>`API` Documentation from `NYT`: https://</a:t>
+            </a:r>
+            <a:r>
+              <a:rPr lang="en-US" b="0" dirty="0" err="1">
+                <a:effectLst/>
+                <a:latin typeface="Menlo" panose="020B0609030804020204" pitchFamily="49" charset="0"/>
+              </a:rPr>
+              <a:t>developer.nytimes.com</a:t>
+            </a:r>
+            <a:r>
+              <a:rPr lang="en-US" b="0" dirty="0">
+                <a:effectLst/>
+                <a:latin typeface="Menlo" panose="020B0609030804020204" pitchFamily="49" charset="0"/>
+              </a:rPr>
+              <a:t>/</a:t>
+            </a:r>
+            <a:r>
+              <a:rPr lang="en-US" b="0" dirty="0" err="1">
+                <a:effectLst/>
+                <a:latin typeface="Menlo" panose="020B0609030804020204" pitchFamily="49" charset="0"/>
+              </a:rPr>
+              <a:t>apis</a:t>
+            </a:r>
+            <a:endParaRPr lang="en-US" b="0" dirty="0">
+              <a:effectLst/>
+              <a:latin typeface="Menlo" panose="020B0609030804020204" pitchFamily="49" charset="0"/>
+            </a:endParaRPr>
+          </a:p>
+          <a:p>
+            <a:r>
+              <a:rPr lang="en-US" b="0" dirty="0">
+                <a:effectLst/>
+                <a:latin typeface="Menlo" panose="020B0609030804020204" pitchFamily="49" charset="0"/>
+              </a:rPr>
+              <a:t>Code for </a:t>
+            </a:r>
+            <a:r>
+              <a:rPr lang="en-US" b="0" dirty="0" err="1">
+                <a:effectLst/>
+                <a:latin typeface="Menlo" panose="020B0609030804020204" pitchFamily="49" charset="0"/>
+              </a:rPr>
+              <a:t>webscraping</a:t>
+            </a:r>
+            <a:r>
+              <a:rPr lang="en-US" b="0" dirty="0">
+                <a:effectLst/>
+                <a:latin typeface="Menlo" panose="020B0609030804020204" pitchFamily="49" charset="0"/>
+              </a:rPr>
+              <a:t> adapted from fellow </a:t>
+            </a:r>
+            <a:r>
+              <a:rPr lang="en-US" b="0" dirty="0" err="1">
+                <a:effectLst/>
+                <a:latin typeface="Menlo" panose="020B0609030804020204" pitchFamily="49" charset="0"/>
+              </a:rPr>
+              <a:t>coursemate's</a:t>
+            </a:r>
+            <a:r>
+              <a:rPr lang="en-US" b="0" dirty="0">
+                <a:effectLst/>
+                <a:latin typeface="Menlo" panose="020B0609030804020204" pitchFamily="49" charset="0"/>
+              </a:rPr>
+              <a:t> group project, with their permission this code was included in the pipeline for this project.</a:t>
+            </a:r>
+          </a:p>
+          <a:p>
+            <a:r>
+              <a:rPr lang="en-US" b="0" dirty="0">
+                <a:effectLst/>
+                <a:latin typeface="Menlo" panose="020B0609030804020204" pitchFamily="49" charset="0"/>
+              </a:rPr>
+              <a:t>Snorkel documentation for Cohen Kappa Score labeling: https://</a:t>
+            </a:r>
+            <a:r>
+              <a:rPr lang="en-US" b="0" dirty="0" err="1">
+                <a:effectLst/>
+                <a:latin typeface="Menlo" panose="020B0609030804020204" pitchFamily="49" charset="0"/>
+              </a:rPr>
+              <a:t>www.snorkel.org</a:t>
+            </a:r>
+            <a:endParaRPr lang="en-US" b="0" dirty="0">
+              <a:effectLst/>
+              <a:latin typeface="Menlo" panose="020B0609030804020204" pitchFamily="49" charset="0"/>
+            </a:endParaRPr>
+          </a:p>
+          <a:p>
+            <a:r>
+              <a:rPr lang="en-US" b="0" dirty="0">
+                <a:effectLst/>
+                <a:latin typeface="Menlo" panose="020B0609030804020204" pitchFamily="49" charset="0"/>
+              </a:rPr>
+              <a:t>Pew Center Article on Bias: https://</a:t>
+            </a:r>
+            <a:r>
+              <a:rPr lang="en-US" b="0" dirty="0" err="1">
+                <a:effectLst/>
+                <a:latin typeface="Menlo" panose="020B0609030804020204" pitchFamily="49" charset="0"/>
+              </a:rPr>
+              <a:t>www.pewresearch.org</a:t>
+            </a:r>
+            <a:r>
+              <a:rPr lang="en-US" b="0" dirty="0">
+                <a:effectLst/>
+                <a:latin typeface="Menlo" panose="020B0609030804020204" pitchFamily="49" charset="0"/>
+              </a:rPr>
+              <a:t>/internet/2017/10/19/the-future-of-truth-and-misinformation-online</a:t>
+            </a:r>
+          </a:p>
+          <a:p>
+            <a:r>
+              <a:rPr lang="en-US" b="0" dirty="0">
+                <a:effectLst/>
+                <a:latin typeface="Menlo" panose="020B0609030804020204" pitchFamily="49" charset="0"/>
+              </a:rPr>
+              <a:t>VADER Documentation: https://</a:t>
+            </a:r>
+            <a:r>
+              <a:rPr lang="en-US" b="0" dirty="0" err="1">
+                <a:effectLst/>
+                <a:latin typeface="Menlo" panose="020B0609030804020204" pitchFamily="49" charset="0"/>
+              </a:rPr>
+              <a:t>vadersentiment.readthedocs.io</a:t>
+            </a:r>
+            <a:endParaRPr lang="en-US" b="0" dirty="0">
+              <a:effectLst/>
+              <a:latin typeface="Menlo" panose="020B0609030804020204" pitchFamily="49" charset="0"/>
+            </a:endParaRPr>
+          </a:p>
+          <a:p>
+            <a:r>
+              <a:rPr lang="en-US" b="0" dirty="0">
+                <a:effectLst/>
+                <a:latin typeface="Menlo" panose="020B0609030804020204" pitchFamily="49" charset="0"/>
+              </a:rPr>
+              <a:t>Kaggle GPU Documentation: https://</a:t>
+            </a:r>
+            <a:r>
+              <a:rPr lang="en-US" b="0" dirty="0" err="1">
+                <a:effectLst/>
+                <a:latin typeface="Menlo" panose="020B0609030804020204" pitchFamily="49" charset="0"/>
+              </a:rPr>
+              <a:t>www.kaggle.com</a:t>
+            </a:r>
+            <a:r>
+              <a:rPr lang="en-US" b="0" dirty="0">
+                <a:effectLst/>
+                <a:latin typeface="Menlo" panose="020B0609030804020204" pitchFamily="49" charset="0"/>
+              </a:rPr>
+              <a:t>/code/</a:t>
+            </a:r>
+            <a:r>
+              <a:rPr lang="en-US" b="0" dirty="0" err="1">
+                <a:effectLst/>
+                <a:latin typeface="Menlo" panose="020B0609030804020204" pitchFamily="49" charset="0"/>
+              </a:rPr>
+              <a:t>dansbecker</a:t>
+            </a:r>
+            <a:r>
+              <a:rPr lang="en-US" b="0" dirty="0">
+                <a:effectLst/>
+                <a:latin typeface="Menlo" panose="020B0609030804020204" pitchFamily="49" charset="0"/>
+              </a:rPr>
+              <a:t>/running-</a:t>
+            </a:r>
+            <a:r>
+              <a:rPr lang="en-US" b="0" dirty="0" err="1">
+                <a:effectLst/>
+                <a:latin typeface="Menlo" panose="020B0609030804020204" pitchFamily="49" charset="0"/>
+              </a:rPr>
+              <a:t>kaggle</a:t>
+            </a:r>
+            <a:r>
+              <a:rPr lang="en-US" b="0" dirty="0">
+                <a:effectLst/>
+                <a:latin typeface="Menlo" panose="020B0609030804020204" pitchFamily="49" charset="0"/>
+              </a:rPr>
+              <a:t>-kernels-with-a-</a:t>
+            </a:r>
+            <a:r>
+              <a:rPr lang="en-US" b="0" dirty="0" err="1">
+                <a:effectLst/>
+                <a:latin typeface="Menlo" panose="020B0609030804020204" pitchFamily="49" charset="0"/>
+              </a:rPr>
+              <a:t>gpu</a:t>
+            </a:r>
+            <a:endParaRPr lang="en-US" b="0" dirty="0">
+              <a:effectLst/>
+              <a:latin typeface="Menlo" panose="020B0609030804020204" pitchFamily="49" charset="0"/>
+            </a:endParaRPr>
+          </a:p>
+          <a:p>
+            <a:r>
+              <a:rPr lang="en-US" b="0" dirty="0">
+                <a:effectLst/>
+                <a:latin typeface="Menlo" panose="020B0609030804020204" pitchFamily="49" charset="0"/>
+              </a:rPr>
+              <a:t>CBOW/Skip Gram: https://</a:t>
+            </a:r>
+            <a:r>
+              <a:rPr lang="en-US" b="0" dirty="0" err="1">
+                <a:effectLst/>
+                <a:latin typeface="Menlo" panose="020B0609030804020204" pitchFamily="49" charset="0"/>
+              </a:rPr>
+              <a:t>towardsdatascience.com</a:t>
+            </a:r>
+            <a:r>
+              <a:rPr lang="en-US" b="0" dirty="0">
+                <a:effectLst/>
+                <a:latin typeface="Menlo" panose="020B0609030804020204" pitchFamily="49" charset="0"/>
+              </a:rPr>
+              <a:t>/understanding-feature-engineering-part-4-deep-learning-methods-for-text-data-96c44370bbfa</a:t>
+            </a:r>
+          </a:p>
+          <a:p>
+            <a:r>
+              <a:rPr lang="en-US" b="0" dirty="0">
+                <a:effectLst/>
+                <a:latin typeface="Menlo" panose="020B0609030804020204" pitchFamily="49" charset="0"/>
+              </a:rPr>
+              <a:t>CBOW/</a:t>
+            </a:r>
+            <a:r>
+              <a:rPr lang="en-US" b="0" dirty="0" err="1">
+                <a:effectLst/>
+                <a:latin typeface="Menlo" panose="020B0609030804020204" pitchFamily="49" charset="0"/>
+              </a:rPr>
+              <a:t>SKip</a:t>
+            </a:r>
+            <a:r>
+              <a:rPr lang="en-US" b="0" dirty="0">
+                <a:effectLst/>
+                <a:latin typeface="Menlo" panose="020B0609030804020204" pitchFamily="49" charset="0"/>
+              </a:rPr>
+              <a:t> Gram: https://</a:t>
+            </a:r>
+            <a:r>
+              <a:rPr lang="en-US" b="0" dirty="0" err="1">
+                <a:effectLst/>
+                <a:latin typeface="Menlo" panose="020B0609030804020204" pitchFamily="49" charset="0"/>
+              </a:rPr>
+              <a:t>medium.com</a:t>
+            </a:r>
+            <a:r>
+              <a:rPr lang="en-US" b="0" dirty="0">
+                <a:effectLst/>
+                <a:latin typeface="Menlo" panose="020B0609030804020204" pitchFamily="49" charset="0"/>
+              </a:rPr>
+              <a:t>/@dube.aditya8/word2vec-skip-gram-cbow-b5e802b00390</a:t>
+            </a:r>
+          </a:p>
+          <a:p>
+            <a:r>
+              <a:rPr lang="en-US" b="0" dirty="0">
+                <a:effectLst/>
+                <a:latin typeface="Menlo" panose="020B0609030804020204" pitchFamily="49" charset="0"/>
+              </a:rPr>
+              <a:t>KDE Plot Documentation: https://</a:t>
+            </a:r>
+            <a:r>
+              <a:rPr lang="en-US" b="0" dirty="0" err="1">
+                <a:effectLst/>
+                <a:latin typeface="Menlo" panose="020B0609030804020204" pitchFamily="49" charset="0"/>
+              </a:rPr>
+              <a:t>seaborn.pydata.org</a:t>
+            </a:r>
+            <a:r>
+              <a:rPr lang="en-US" b="0" dirty="0">
+                <a:effectLst/>
+                <a:latin typeface="Menlo" panose="020B0609030804020204" pitchFamily="49" charset="0"/>
+              </a:rPr>
+              <a:t>/generated/</a:t>
+            </a:r>
+            <a:r>
+              <a:rPr lang="en-US" b="0" dirty="0" err="1">
+                <a:effectLst/>
+                <a:latin typeface="Menlo" panose="020B0609030804020204" pitchFamily="49" charset="0"/>
+              </a:rPr>
+              <a:t>seaborn.kdeplot.html</a:t>
+            </a:r>
+            <a:endParaRPr lang="en-US" b="0" dirty="0">
+              <a:effectLst/>
+              <a:latin typeface="Menlo" panose="020B0609030804020204" pitchFamily="49" charset="0"/>
+            </a:endParaRPr>
+          </a:p>
+          <a:p>
+            <a:endParaRPr lang="en-US" dirty="0"/>
+          </a:p>
+        </p:txBody>
+      </p:sp>
+    </p:spTree>
+    <p:extLst>
+      <p:ext uri="{BB962C8B-B14F-4D97-AF65-F5344CB8AC3E}">
+        <p14:creationId xmlns:p14="http://schemas.microsoft.com/office/powerpoint/2010/main" val="743514107"/>
       </p:ext>
     </p:extLst>
   </p:cSld>
@@ -4616,7 +5236,12 @@
             <p:ph type="title"/>
           </p:nvPr>
         </p:nvSpPr>
-        <p:spPr/>
+        <p:spPr>
+          <a:xfrm>
+            <a:off x="1839686" y="110935"/>
+            <a:ext cx="9905999" cy="1360898"/>
+          </a:xfrm>
+        </p:spPr>
         <p:txBody>
           <a:bodyPr/>
           <a:lstStyle/>
@@ -4647,9 +5272,16 @@
             <p:ph idx="1"/>
           </p:nvPr>
         </p:nvSpPr>
-        <p:spPr/>
-        <p:txBody>
-          <a:bodyPr/>
+        <p:spPr>
+          <a:xfrm>
+            <a:off x="1143000" y="1471833"/>
+            <a:ext cx="9905999" cy="4221396"/>
+          </a:xfrm>
+        </p:spPr>
+        <p:txBody>
+          <a:bodyPr>
+            <a:noAutofit/>
+          </a:bodyPr>
           <a:lstStyle/>
           <a:p>
             <a:pPr algn="l">
@@ -4680,14 +5312,41 @@
               </a:rPr>
               <a:t>We present novel methods for determining bias within abstracts/headlines of online articles, label these articles based on relative bias levels, and harness these labels to train a neural network model capable of upscaling this labeling process.</a:t>
             </a:r>
-            <a:endParaRPr lang="en-US" b="0" i="0" u="none" strike="noStrike" dirty="0">
-              <a:solidFill>
-                <a:srgbClr val="E6EDF3"/>
-              </a:solidFill>
-              <a:effectLst/>
-              <a:latin typeface="Times New Roman" panose="02020603050405020304" pitchFamily="18" charset="0"/>
-              <a:cs typeface="Times New Roman" panose="02020603050405020304" pitchFamily="18" charset="0"/>
-            </a:endParaRPr>
+          </a:p>
+          <a:p>
+            <a:r>
+              <a:rPr lang="en-US" b="1" i="0" u="none" strike="noStrike" dirty="0">
+                <a:solidFill>
+                  <a:srgbClr val="E6EDF3"/>
+                </a:solidFill>
+                <a:effectLst/>
+                <a:latin typeface="Times New Roman" panose="02020603050405020304" pitchFamily="18" charset="0"/>
+                <a:cs typeface="Times New Roman" panose="02020603050405020304" pitchFamily="18" charset="0"/>
+              </a:rPr>
+              <a:t>The result was a </a:t>
+            </a:r>
+            <a:r>
+              <a:rPr lang="en-US" b="1" i="0" u="none" strike="noStrike" dirty="0" err="1">
+                <a:solidFill>
+                  <a:srgbClr val="E6EDF3"/>
+                </a:solidFill>
+                <a:effectLst/>
+                <a:latin typeface="Times New Roman" panose="02020603050405020304" pitchFamily="18" charset="0"/>
+                <a:cs typeface="Times New Roman" panose="02020603050405020304" pitchFamily="18" charset="0"/>
+              </a:rPr>
+              <a:t>Streamlit</a:t>
+            </a:r>
+            <a:r>
+              <a:rPr lang="en-US" b="1" i="0" u="none" strike="noStrike" dirty="0">
+                <a:solidFill>
+                  <a:srgbClr val="E6EDF3"/>
+                </a:solidFill>
+                <a:effectLst/>
+                <a:latin typeface="Times New Roman" panose="02020603050405020304" pitchFamily="18" charset="0"/>
+                <a:cs typeface="Times New Roman" panose="02020603050405020304" pitchFamily="18" charset="0"/>
+              </a:rPr>
+              <a:t> App with a Bias Estimator and Analyzer of Sentiment Tendency (BEAST) Engine, capable of scoring bias on a 0 to 1 scale and returning a sentiment score from -1 to 1. </a:t>
+            </a:r>
           </a:p>
           <a:p>
             <a:pPr algn="l">
@@ -4754,165 +5413,111 @@
             <p:ph type="title"/>
           </p:nvPr>
         </p:nvSpPr>
+        <p:spPr>
+          <a:xfrm>
+            <a:off x="1142999" y="958856"/>
+            <a:ext cx="9905999" cy="1360898"/>
+          </a:xfrm>
+        </p:spPr>
+        <p:txBody>
+          <a:bodyPr/>
+          <a:lstStyle/>
+          <a:p>
+            <a:r>
+              <a:rPr lang="en-US" dirty="0">
+                <a:latin typeface="Times New Roman" panose="02020603050405020304" pitchFamily="18" charset="0"/>
+                <a:cs typeface="Times New Roman" panose="02020603050405020304" pitchFamily="18" charset="0"/>
+              </a:rPr>
+              <a:t>Methods</a:t>
+            </a:r>
+          </a:p>
+        </p:txBody>
+      </p:sp>
+      <p:sp>
+        <p:nvSpPr>
+          <p:cNvPr id="3" name="Content Placeholder 2">
+            <a:extLst>
+              <a:ext uri="{FF2B5EF4-FFF2-40B4-BE49-F238E27FC236}">
+                <a16:creationId xmlns:a16="http://schemas.microsoft.com/office/drawing/2014/main" id="{CD0F9A21-7AF5-AC75-484E-1AA11799D0C7}"/>
+              </a:ext>
+            </a:extLst>
+          </p:cNvPr>
+          <p:cNvSpPr>
+            <a:spLocks noGrp="1"/>
+          </p:cNvSpPr>
+          <p:nvPr>
+            <p:ph idx="1"/>
+          </p:nvPr>
+        </p:nvSpPr>
         <p:spPr/>
         <p:txBody>
-          <a:bodyPr/>
-          <a:lstStyle/>
+          <a:bodyPr>
+            <a:normAutofit/>
+          </a:bodyPr>
+          <a:lstStyle/>
+          <a:p>
+            <a:r>
+              <a:rPr lang="en-US" dirty="0" err="1">
+                <a:latin typeface="Times New Roman" panose="02020603050405020304" pitchFamily="18" charset="0"/>
+                <a:cs typeface="Times New Roman" panose="02020603050405020304" pitchFamily="18" charset="0"/>
+              </a:rPr>
+              <a:t>Webscraping</a:t>
+            </a:r>
+            <a:endParaRPr lang="en-US" dirty="0">
+              <a:latin typeface="Times New Roman" panose="02020603050405020304" pitchFamily="18" charset="0"/>
+              <a:cs typeface="Times New Roman" panose="02020603050405020304" pitchFamily="18" charset="0"/>
+            </a:endParaRPr>
+          </a:p>
           <a:p>
             <a:r>
               <a:rPr lang="en-US" dirty="0">
                 <a:latin typeface="Times New Roman" panose="02020603050405020304" pitchFamily="18" charset="0"/>
                 <a:cs typeface="Times New Roman" panose="02020603050405020304" pitchFamily="18" charset="0"/>
               </a:rPr>
-              <a:t>Methods</a:t>
-            </a:r>
-          </a:p>
-        </p:txBody>
-      </p:sp>
-      <p:sp>
-        <p:nvSpPr>
-          <p:cNvPr id="3" name="Content Placeholder 2">
-            <a:extLst>
-              <a:ext uri="{FF2B5EF4-FFF2-40B4-BE49-F238E27FC236}">
-                <a16:creationId xmlns:a16="http://schemas.microsoft.com/office/drawing/2014/main" id="{CD0F9A21-7AF5-AC75-484E-1AA11799D0C7}"/>
-              </a:ext>
-            </a:extLst>
-          </p:cNvPr>
-          <p:cNvSpPr>
-            <a:spLocks noGrp="1"/>
-          </p:cNvSpPr>
-          <p:nvPr>
-            <p:ph idx="1"/>
-          </p:nvPr>
-        </p:nvSpPr>
-        <p:spPr/>
-        <p:txBody>
-          <a:bodyPr>
-            <a:normAutofit fontScale="92500" lnSpcReduction="20000"/>
-          </a:bodyPr>
-          <a:lstStyle/>
+              <a:t>Natural Language Processing Binary Classification Modeling</a:t>
+            </a:r>
+          </a:p>
+          <a:p>
+            <a:r>
+              <a:rPr lang="en-US" dirty="0">
+                <a:latin typeface="Times New Roman" panose="02020603050405020304" pitchFamily="18" charset="0"/>
+                <a:cs typeface="Times New Roman" panose="02020603050405020304" pitchFamily="18" charset="0"/>
+              </a:rPr>
+              <a:t>Labeling Functions with Proprietary Snorkel Functions</a:t>
+            </a:r>
+          </a:p>
+          <a:p>
+            <a:r>
+              <a:rPr lang="en-US" dirty="0">
+                <a:latin typeface="Times New Roman" panose="02020603050405020304" pitchFamily="18" charset="0"/>
+                <a:cs typeface="Times New Roman" panose="02020603050405020304" pitchFamily="18" charset="0"/>
+              </a:rPr>
+              <a:t>Long Short Term Memory (LSTM) Neural Networks, </a:t>
+            </a:r>
+          </a:p>
+          <a:p>
+            <a:r>
+              <a:rPr lang="en-US" dirty="0">
+                <a:latin typeface="Times New Roman" panose="02020603050405020304" pitchFamily="18" charset="0"/>
+                <a:cs typeface="Times New Roman" panose="02020603050405020304" pitchFamily="18" charset="0"/>
+              </a:rPr>
+              <a:t>Word2Vec, Continuous Bag Of Words, and Skip Gram word encoding algorithms.</a:t>
+            </a:r>
+          </a:p>
           <a:p>
             <a:r>
               <a:rPr lang="en-US" dirty="0" err="1">
                 <a:latin typeface="Times New Roman" panose="02020603050405020304" pitchFamily="18" charset="0"/>
                 <a:cs typeface="Times New Roman" panose="02020603050405020304" pitchFamily="18" charset="0"/>
               </a:rPr>
-              <a:t>Webscraping</a:t>
+              <a:t>Streamlit</a:t>
             </a:r>
             <a:r>
               <a:rPr lang="en-US" dirty="0">
                 <a:latin typeface="Times New Roman" panose="02020603050405020304" pitchFamily="18" charset="0"/>
                 <a:cs typeface="Times New Roman" panose="02020603050405020304" pitchFamily="18" charset="0"/>
               </a:rPr>
-              <a:t> with New York Times API </a:t>
-            </a:r>
-          </a:p>
-          <a:p>
-            <a:r>
-              <a:rPr lang="en-US" dirty="0">
-                <a:latin typeface="Times New Roman" panose="02020603050405020304" pitchFamily="18" charset="0"/>
-                <a:cs typeface="Times New Roman" panose="02020603050405020304" pitchFamily="18" charset="0"/>
-              </a:rPr>
-              <a:t>Natural Language Processing Binary Classification Models</a:t>
-            </a:r>
-          </a:p>
-          <a:p>
-            <a:r>
-              <a:rPr lang="en-US" dirty="0">
-                <a:latin typeface="Times New Roman" panose="02020603050405020304" pitchFamily="18" charset="0"/>
-                <a:cs typeface="Times New Roman" panose="02020603050405020304" pitchFamily="18" charset="0"/>
-              </a:rPr>
-              <a:t>Labeling Functions with Proprietary Snorkel Functions</a:t>
-            </a:r>
-          </a:p>
-          <a:p>
-            <a:r>
-              <a:rPr lang="en-US" dirty="0">
-                <a:latin typeface="Times New Roman" panose="02020603050405020304" pitchFamily="18" charset="0"/>
-                <a:cs typeface="Times New Roman" panose="02020603050405020304" pitchFamily="18" charset="0"/>
-              </a:rPr>
-              <a:t>Long Short Term Memory (LSTM) Neural Networks, Word2Vec, Continuous Bag Of Words, and Skip Grams algorithms.</a:t>
-            </a:r>
-          </a:p>
-          <a:p>
-            <a:r>
-              <a:rPr lang="en-US" dirty="0">
-                <a:latin typeface="Times New Roman" panose="02020603050405020304" pitchFamily="18" charset="0"/>
-                <a:cs typeface="Times New Roman" panose="02020603050405020304" pitchFamily="18" charset="0"/>
-              </a:rPr>
-              <a:t>Custom Sentiment Analyzer validated with </a:t>
-            </a:r>
-            <a:r>
-              <a:rPr lang="en-US" b="0" i="0" u="none" strike="noStrike" dirty="0">
-                <a:solidFill>
-                  <a:srgbClr val="E6EDF3"/>
-                </a:solidFill>
-                <a:effectLst/>
-                <a:latin typeface="Times New Roman" panose="02020603050405020304" pitchFamily="18" charset="0"/>
-                <a:cs typeface="Times New Roman" panose="02020603050405020304" pitchFamily="18" charset="0"/>
-              </a:rPr>
-              <a:t>VADER (Valence Aware Dictionary and </a:t>
-            </a:r>
-            <a:r>
-              <a:rPr lang="en-US" b="0" i="0" u="none" strike="noStrike" dirty="0" err="1">
-                <a:solidFill>
-                  <a:srgbClr val="E6EDF3"/>
-                </a:solidFill>
-                <a:effectLst/>
-                <a:latin typeface="Times New Roman" panose="02020603050405020304" pitchFamily="18" charset="0"/>
-                <a:cs typeface="Times New Roman" panose="02020603050405020304" pitchFamily="18" charset="0"/>
-              </a:rPr>
-              <a:t>sEntiment</a:t>
-            </a:r>
-            <a:r>
-              <a:rPr lang="en-US" b="0" i="0" u="none" strike="noStrike" dirty="0">
-                <a:solidFill>
-                  <a:srgbClr val="E6EDF3"/>
-                </a:solidFill>
-                <a:effectLst/>
-                <a:latin typeface="Times New Roman" panose="02020603050405020304" pitchFamily="18" charset="0"/>
-                <a:cs typeface="Times New Roman" panose="02020603050405020304" pitchFamily="18" charset="0"/>
-              </a:rPr>
-              <a:t> Reasoner)</a:t>
-            </a:r>
-            <a:r>
-              <a:rPr lang="en-US" dirty="0">
-                <a:latin typeface="Times New Roman" panose="02020603050405020304" pitchFamily="18" charset="0"/>
-                <a:cs typeface="Times New Roman" panose="02020603050405020304" pitchFamily="18" charset="0"/>
-              </a:rPr>
-              <a:t> sentiment analyzer. </a:t>
-            </a:r>
-          </a:p>
-          <a:p>
-            <a:r>
-              <a:rPr lang="en-US" dirty="0">
-                <a:latin typeface="Times New Roman" panose="02020603050405020304" pitchFamily="18" charset="0"/>
-                <a:cs typeface="Times New Roman" panose="02020603050405020304" pitchFamily="18" charset="0"/>
-              </a:rPr>
-              <a:t>Kernel Density Estimation Plots and A/B Analysis on Function and Analyzer Outputs. </a:t>
-            </a:r>
-          </a:p>
-          <a:p>
-            <a:r>
-              <a:rPr lang="en-US" dirty="0">
-                <a:latin typeface="Times New Roman" panose="02020603050405020304" pitchFamily="18" charset="0"/>
-                <a:cs typeface="Times New Roman" panose="02020603050405020304" pitchFamily="18" charset="0"/>
-              </a:rPr>
-              <a:t>Deploy Application via </a:t>
-            </a:r>
-            <a:r>
-              <a:rPr lang="en-US" dirty="0" err="1">
-                <a:latin typeface="Times New Roman" panose="02020603050405020304" pitchFamily="18" charset="0"/>
-                <a:cs typeface="Times New Roman" panose="02020603050405020304" pitchFamily="18" charset="0"/>
-              </a:rPr>
-              <a:t>Streamlit</a:t>
-            </a:r>
-            <a:r>
-              <a:rPr lang="en-US" dirty="0">
-                <a:latin typeface="Times New Roman" panose="02020603050405020304" pitchFamily="18" charset="0"/>
-                <a:cs typeface="Times New Roman" panose="02020603050405020304" pitchFamily="18" charset="0"/>
-              </a:rPr>
-              <a:t> App Service</a:t>
+              <a:t> App Services</a:t>
             </a:r>
           </a:p>
           <a:p>
@@ -5061,11 +5666,31 @@
           </a:p>
           <a:p>
             <a:r>
+              <a:rPr lang="en-US">
+                <a:latin typeface="Times New Roman" panose="02020603050405020304" pitchFamily="18" charset="0"/>
+                <a:cs typeface="Times New Roman" panose="02020603050405020304" pitchFamily="18" charset="0"/>
+              </a:rPr>
+              <a:t>Sentiment Analysis </a:t>
+            </a:r>
+            <a:endParaRPr lang="en-US" dirty="0">
+              <a:latin typeface="Times New Roman" panose="02020603050405020304" pitchFamily="18" charset="0"/>
+              <a:cs typeface="Times New Roman" panose="02020603050405020304" pitchFamily="18" charset="0"/>
+            </a:endParaRPr>
+          </a:p>
+          <a:p>
+            <a:r>
+              <a:rPr lang="en-US" dirty="0" err="1">
+                <a:latin typeface="Times New Roman" panose="02020603050405020304" pitchFamily="18" charset="0"/>
+                <a:cs typeface="Times New Roman" panose="02020603050405020304" pitchFamily="18" charset="0"/>
+              </a:rPr>
+              <a:t>Streamlit</a:t>
+            </a:r>
+            <a:r>
               <a:rPr lang="en-US" dirty="0">
                 <a:latin typeface="Times New Roman" panose="02020603050405020304" pitchFamily="18" charset="0"/>
                 <a:cs typeface="Times New Roman" panose="02020603050405020304" pitchFamily="18" charset="0"/>
               </a:rPr>
-              <a:t>Sentiment Analyzing and App Deployment</a:t>
+              <a:t> App Deployment</a:t>
             </a:r>
           </a:p>
         </p:txBody>
@@ -5732,7 +6357,10 @@
           <a:lstStyle/>
           <a:p>
             <a:r>
-              <a:rPr lang="en-US" dirty="0"/>
+              <a:rPr lang="en-US" dirty="0">
+                <a:latin typeface="Times New Roman" panose="02020603050405020304" pitchFamily="18" charset="0"/>
+                <a:cs typeface="Times New Roman" panose="02020603050405020304" pitchFamily="18" charset="0"/>
+              </a:rPr>
               <a:t>Neural Networks</a:t>
             </a:r>
           </a:p>
@@ -5759,7 +6387,31 @@
           <a:bodyPr/>
           <a:lstStyle/>
           <a:p>
-            <a:endParaRPr lang="en-US" dirty="0"/>
+            <a:r>
+              <a:rPr lang="en-US" dirty="0">
+                <a:latin typeface="Times New Roman" panose="02020603050405020304" pitchFamily="18" charset="0"/>
+                <a:cs typeface="Times New Roman" panose="02020603050405020304" pitchFamily="18" charset="0"/>
+              </a:rPr>
+              <a:t>Long Short Term Memory (LSTM) Categorical model with multiple layers. </a:t>
+            </a:r>
+          </a:p>
+          <a:p>
+            <a:r>
+              <a:rPr lang="en-US" dirty="0">
+                <a:latin typeface="Times New Roman" panose="02020603050405020304" pitchFamily="18" charset="0"/>
+                <a:cs typeface="Times New Roman" panose="02020603050405020304" pitchFamily="18" charset="0"/>
+              </a:rPr>
+              <a:t>Word2Vec, Continuous Bag of Words, Skip Grams word encoding algorithms with neural networks. </a:t>
+            </a:r>
+          </a:p>
+          <a:p>
+            <a:r>
+              <a:rPr lang="en-US" dirty="0">
+                <a:latin typeface="Times New Roman" panose="02020603050405020304" pitchFamily="18" charset="0"/>
+                <a:cs typeface="Times New Roman" panose="02020603050405020304" pitchFamily="18" charset="0"/>
+              </a:rPr>
+              <a:t>Interspersed were Cosine Similarity, Clustering, PCA. [Insert Plots]</a:t>
+            </a:r>
           </a:p>
         </p:txBody>
       </p:sp>
@@ -5809,13 +6461,21 @@
             <p:ph type="title"/>
           </p:nvPr>
         </p:nvSpPr>
-        <p:spPr/>
+        <p:spPr>
+          <a:xfrm>
+            <a:off x="1142999" y="0"/>
+            <a:ext cx="9905999" cy="1360898"/>
+          </a:xfrm>
+        </p:spPr>
         <p:txBody>
           <a:bodyPr/>
           <a:lstStyle/>
           <a:p>
             <a:r>
-              <a:rPr lang="en-US" dirty="0"/>
+              <a:rPr lang="en-US" dirty="0">
+                <a:latin typeface="Times New Roman" panose="02020603050405020304" pitchFamily="18" charset="0"/>
+                <a:cs typeface="Times New Roman" panose="02020603050405020304" pitchFamily="18" charset="0"/>
+              </a:rPr>
               <a:t>Summary of Results and Analysis</a:t>
             </a:r>
           </a:p>
@@ -5837,12 +6497,182 @@
             <p:ph idx="1"/>
           </p:nvPr>
         </p:nvSpPr>
-        <p:spPr/>
-        <p:txBody>
-          <a:bodyPr/>
-          <a:lstStyle/>
-          <a:p>
-            <a:endParaRPr lang="en-US"/>
+        <p:spPr>
+          <a:xfrm>
+            <a:off x="1142998" y="1243233"/>
+            <a:ext cx="9905999" cy="4754796"/>
+          </a:xfrm>
+        </p:spPr>
+        <p:txBody>
+          <a:bodyPr>
+            <a:noAutofit/>
+          </a:bodyPr>
+          <a:lstStyle/>
+          <a:p>
+            <a:r>
+              <a:rPr lang="en-US" sz="1600" dirty="0">
+                <a:latin typeface="Times New Roman" panose="02020603050405020304" pitchFamily="18" charset="0"/>
+                <a:cs typeface="Times New Roman" panose="02020603050405020304" pitchFamily="18" charset="0"/>
+              </a:rPr>
+              <a:t>Performance of Binary Classification Model (Support Vector Machine with </a:t>
+            </a:r>
+            <a:r>
+              <a:rPr lang="en-US" sz="1600" dirty="0" err="1">
+                <a:latin typeface="Times New Roman" panose="02020603050405020304" pitchFamily="18" charset="0"/>
+                <a:cs typeface="Times New Roman" panose="02020603050405020304" pitchFamily="18" charset="0"/>
+              </a:rPr>
+              <a:t>TfidfVectorizer</a:t>
+            </a:r>
+            <a:r>
+              <a:rPr lang="en-US" sz="1600" dirty="0">
+                <a:latin typeface="Times New Roman" panose="02020603050405020304" pitchFamily="18" charset="0"/>
+                <a:cs typeface="Times New Roman" panose="02020603050405020304" pitchFamily="18" charset="0"/>
+              </a:rPr>
+              <a:t>) </a:t>
+            </a:r>
+          </a:p>
+          <a:p>
+            <a:pPr marL="0" indent="0" algn="ctr">
+              <a:buNone/>
+            </a:pPr>
+            <a:r>
+              <a:rPr lang="en-US" sz="1600" dirty="0">
+                <a:latin typeface="Times New Roman" panose="02020603050405020304" pitchFamily="18" charset="0"/>
+                <a:cs typeface="Times New Roman" panose="02020603050405020304" pitchFamily="18" charset="0"/>
+              </a:rPr>
+              <a:t>1.0 Train | 0.88 Test | </a:t>
+            </a:r>
+            <a:r>
+              <a:rPr lang="en-US" sz="1600" b="0" i="0" dirty="0">
+                <a:effectLst/>
+                <a:latin typeface="Times New Roman" panose="02020603050405020304" pitchFamily="18" charset="0"/>
+                <a:cs typeface="Times New Roman" panose="02020603050405020304" pitchFamily="18" charset="0"/>
+              </a:rPr>
+              <a:t>Sensitivity 0.66 | Specificity 0.95 | Accuracy 0.88 | Precision 0.800 | </a:t>
+            </a:r>
+          </a:p>
+          <a:p>
+            <a:pPr marL="0" indent="0" algn="ctr">
+              <a:buNone/>
+            </a:pPr>
+            <a:r>
+              <a:rPr lang="en-US" sz="1600" b="0" i="0" dirty="0">
+                <a:effectLst/>
+                <a:latin typeface="Times New Roman" panose="02020603050405020304" pitchFamily="18" charset="0"/>
+                <a:cs typeface="Times New Roman" panose="02020603050405020304" pitchFamily="18" charset="0"/>
+              </a:rPr>
+              <a:t>Miscalculation Rate 0.12 | F1 Score 0.72</a:t>
+            </a:r>
+            <a:endParaRPr lang="en-US" sz="1600" dirty="0">
+              <a:latin typeface="Times New Roman" panose="02020603050405020304" pitchFamily="18" charset="0"/>
+              <a:cs typeface="Times New Roman" panose="02020603050405020304" pitchFamily="18" charset="0"/>
+            </a:endParaRPr>
+          </a:p>
+          <a:p>
+            <a:r>
+              <a:rPr lang="en-US" sz="1600" dirty="0">
+                <a:latin typeface="Times New Roman" panose="02020603050405020304" pitchFamily="18" charset="0"/>
+                <a:cs typeface="Times New Roman" panose="02020603050405020304" pitchFamily="18" charset="0"/>
+              </a:rPr>
+              <a:t>Performance of Neural Network Model: </a:t>
+            </a:r>
+          </a:p>
+          <a:p>
+            <a:pPr marL="0" indent="0" algn="ctr">
+              <a:buNone/>
+            </a:pPr>
+            <a:r>
+              <a:rPr lang="en-US" sz="1600" dirty="0">
+                <a:latin typeface="Times New Roman" panose="02020603050405020304" pitchFamily="18" charset="0"/>
+                <a:cs typeface="Times New Roman" panose="02020603050405020304" pitchFamily="18" charset="0"/>
+              </a:rPr>
+              <a:t>L</a:t>
+            </a:r>
+            <a:r>
+              <a:rPr lang="en-US" sz="1600" b="0" i="0" dirty="0">
+                <a:effectLst/>
+                <a:latin typeface="Times New Roman" panose="02020603050405020304" pitchFamily="18" charset="0"/>
+                <a:cs typeface="Times New Roman" panose="02020603050405020304" pitchFamily="18" charset="0"/>
+              </a:rPr>
+              <a:t>oss: 0.13 - Accuracy: 0.95 - MSE: 0.006 </a:t>
+            </a:r>
+          </a:p>
+          <a:p>
+            <a:pPr marL="0" indent="0" algn="ctr">
+              <a:buNone/>
+            </a:pPr>
+            <a:r>
+              <a:rPr lang="en-US" sz="1600" b="0" i="0" dirty="0">
+                <a:effectLst/>
+                <a:latin typeface="Times New Roman" panose="02020603050405020304" pitchFamily="18" charset="0"/>
+                <a:cs typeface="Times New Roman" panose="02020603050405020304" pitchFamily="18" charset="0"/>
+              </a:rPr>
+              <a:t>Val</a:t>
+            </a:r>
+            <a:r>
+              <a:rPr lang="en-US" sz="1600" dirty="0">
+                <a:latin typeface="Times New Roman" panose="02020603050405020304" pitchFamily="18" charset="0"/>
+                <a:cs typeface="Times New Roman" panose="02020603050405020304" pitchFamily="18" charset="0"/>
+              </a:rPr>
+              <a:t>idation L</a:t>
+            </a:r>
+            <a:r>
+              <a:rPr lang="en-US" sz="1600" b="0" i="0" dirty="0">
+                <a:effectLst/>
+                <a:latin typeface="Times New Roman" panose="02020603050405020304" pitchFamily="18" charset="0"/>
+                <a:cs typeface="Times New Roman" panose="02020603050405020304" pitchFamily="18" charset="0"/>
+              </a:rPr>
+              <a:t>oss: 2.34 – Validation Accuracy: 0.72 – Validation MSE: 0.05</a:t>
+            </a:r>
+          </a:p>
+          <a:p>
+            <a:pPr marL="0" indent="0">
+              <a:buNone/>
+            </a:pPr>
+            <a:endParaRPr lang="en-US" sz="1600" b="0" i="0" dirty="0">
+              <a:effectLst/>
+              <a:latin typeface="Times New Roman" panose="02020603050405020304" pitchFamily="18" charset="0"/>
+              <a:cs typeface="Times New Roman" panose="02020603050405020304" pitchFamily="18" charset="0"/>
+            </a:endParaRPr>
+          </a:p>
+          <a:p>
+            <a:r>
+              <a:rPr lang="en-US" dirty="0">
+                <a:latin typeface="Times New Roman" panose="02020603050405020304" pitchFamily="18" charset="0"/>
+                <a:cs typeface="Times New Roman" panose="02020603050405020304" pitchFamily="18" charset="0"/>
+              </a:rPr>
+              <a:t>Tendency Towards Bias Scoring App runs on…</a:t>
+            </a:r>
+          </a:p>
+          <a:p>
+            <a:pPr marL="0" indent="0" algn="ctr">
+              <a:buNone/>
+            </a:pPr>
+            <a:r>
+              <a:rPr lang="en-US" sz="2800" b="1" u="sng" dirty="0">
+                <a:solidFill>
+                  <a:srgbClr val="FF0000"/>
+                </a:solidFill>
+                <a:latin typeface="Times New Roman" panose="02020603050405020304" pitchFamily="18" charset="0"/>
+                <a:cs typeface="Times New Roman" panose="02020603050405020304" pitchFamily="18" charset="0"/>
+              </a:rPr>
+              <a:t>Bias Estimator and Analyzer of Sentiment Tendency </a:t>
+            </a:r>
+          </a:p>
+          <a:p>
+            <a:pPr marL="0" indent="0" algn="ctr">
+              <a:buNone/>
+            </a:pPr>
+            <a:r>
+              <a:rPr lang="en-US" sz="2800" b="1" u="sng" dirty="0">
+                <a:solidFill>
+                  <a:srgbClr val="FF0000"/>
+                </a:solidFill>
+                <a:latin typeface="Times New Roman" panose="02020603050405020304" pitchFamily="18" charset="0"/>
+                <a:cs typeface="Times New Roman" panose="02020603050405020304" pitchFamily="18" charset="0"/>
+              </a:rPr>
+              <a:t>(BEAST) Engine</a:t>
+            </a:r>
           </a:p>
         </p:txBody>
       </p:sp>

</xml_diff>

<commit_message>
model 1 file runs fully
</commit_message>
<xml_diff>
--- a/Capstone_Presentation.pptx
+++ b/Capstone_Presentation.pptx
@@ -7577,19 +7577,8 @@
                 <a:latin typeface="Times New Roman" panose="02020603050405020304" pitchFamily="18" charset="0"/>
                 <a:cs typeface="Times New Roman" panose="02020603050405020304" pitchFamily="18" charset="0"/>
               </a:rPr>
-              <a:t>Interspersed were Cosine Similarity, Clustering, PCA</a:t>
-            </a:r>
-            <a:r>
-              <a:rPr lang="en-US">
-                <a:latin typeface="Times New Roman" panose="02020603050405020304" pitchFamily="18" charset="0"/>
-                <a:cs typeface="Times New Roman" panose="02020603050405020304" pitchFamily="18" charset="0"/>
-              </a:rPr>
-              <a:t>. </a:t>
-            </a:r>
-            <a:endParaRPr lang="en-US" dirty="0">
-              <a:latin typeface="Times New Roman" panose="02020603050405020304" pitchFamily="18" charset="0"/>
-              <a:cs typeface="Times New Roman" panose="02020603050405020304" pitchFamily="18" charset="0"/>
-            </a:endParaRPr>
+              <a:t>Interspersed were Cosine Similarity, Clustering, PCA. </a:t>
+            </a:r>
           </a:p>
         </p:txBody>
       </p:sp>

</xml_diff>